<commit_message>
updated CD for Storage component
</commit_message>
<xml_diff>
--- a/docs/diagrams/StorageComponentClassDiagram.pptx
+++ b/docs/diagrams/StorageComponentClassDiagram.pptx
@@ -208,7 +208,7 @@
           <a:p>
             <a:fld id="{F5CC4B3F-88C1-4FFA-B1B6-F41C21DC6924}" type="datetimeFigureOut">
               <a:rPr lang="en-US" smtClean="0"/>
-              <a:t>12/1/2018</a:t>
+              <a:t>4/14/2019</a:t>
             </a:fld>
             <a:endParaRPr lang="en-US"/>
           </a:p>
@@ -654,7 +654,7 @@
           <a:p>
             <a:fld id="{78C97017-6FC3-485B-9764-EAC9E56C1D49}" type="datetimeFigureOut">
               <a:rPr lang="en-US" smtClean="0"/>
-              <a:t>12/1/2018</a:t>
+              <a:t>4/14/2019</a:t>
             </a:fld>
             <a:endParaRPr lang="en-US"/>
           </a:p>
@@ -822,7 +822,7 @@
           <a:p>
             <a:fld id="{78C97017-6FC3-485B-9764-EAC9E56C1D49}" type="datetimeFigureOut">
               <a:rPr lang="en-US" smtClean="0"/>
-              <a:t>12/1/2018</a:t>
+              <a:t>4/14/2019</a:t>
             </a:fld>
             <a:endParaRPr lang="en-US"/>
           </a:p>
@@ -1000,7 +1000,7 @@
           <a:p>
             <a:fld id="{78C97017-6FC3-485B-9764-EAC9E56C1D49}" type="datetimeFigureOut">
               <a:rPr lang="en-US" smtClean="0"/>
-              <a:t>12/1/2018</a:t>
+              <a:t>4/14/2019</a:t>
             </a:fld>
             <a:endParaRPr lang="en-US"/>
           </a:p>
@@ -1168,7 +1168,7 @@
           <a:p>
             <a:fld id="{78C97017-6FC3-485B-9764-EAC9E56C1D49}" type="datetimeFigureOut">
               <a:rPr lang="en-US" smtClean="0"/>
-              <a:t>12/1/2018</a:t>
+              <a:t>4/14/2019</a:t>
             </a:fld>
             <a:endParaRPr lang="en-US"/>
           </a:p>
@@ -1413,7 +1413,7 @@
           <a:p>
             <a:fld id="{78C97017-6FC3-485B-9764-EAC9E56C1D49}" type="datetimeFigureOut">
               <a:rPr lang="en-US" smtClean="0"/>
-              <a:t>12/1/2018</a:t>
+              <a:t>4/14/2019</a:t>
             </a:fld>
             <a:endParaRPr lang="en-US"/>
           </a:p>
@@ -1698,7 +1698,7 @@
           <a:p>
             <a:fld id="{78C97017-6FC3-485B-9764-EAC9E56C1D49}" type="datetimeFigureOut">
               <a:rPr lang="en-US" smtClean="0"/>
-              <a:t>12/1/2018</a:t>
+              <a:t>4/14/2019</a:t>
             </a:fld>
             <a:endParaRPr lang="en-US"/>
           </a:p>
@@ -2117,7 +2117,7 @@
           <a:p>
             <a:fld id="{78C97017-6FC3-485B-9764-EAC9E56C1D49}" type="datetimeFigureOut">
               <a:rPr lang="en-US" smtClean="0"/>
-              <a:t>12/1/2018</a:t>
+              <a:t>4/14/2019</a:t>
             </a:fld>
             <a:endParaRPr lang="en-US"/>
           </a:p>
@@ -2234,7 +2234,7 @@
           <a:p>
             <a:fld id="{78C97017-6FC3-485B-9764-EAC9E56C1D49}" type="datetimeFigureOut">
               <a:rPr lang="en-US" smtClean="0"/>
-              <a:t>12/1/2018</a:t>
+              <a:t>4/14/2019</a:t>
             </a:fld>
             <a:endParaRPr lang="en-US"/>
           </a:p>
@@ -2329,7 +2329,7 @@
           <a:p>
             <a:fld id="{78C97017-6FC3-485B-9764-EAC9E56C1D49}" type="datetimeFigureOut">
               <a:rPr lang="en-US" smtClean="0"/>
-              <a:t>12/1/2018</a:t>
+              <a:t>4/14/2019</a:t>
             </a:fld>
             <a:endParaRPr lang="en-US"/>
           </a:p>
@@ -2604,7 +2604,7 @@
           <a:p>
             <a:fld id="{78C97017-6FC3-485B-9764-EAC9E56C1D49}" type="datetimeFigureOut">
               <a:rPr lang="en-US" smtClean="0"/>
-              <a:t>12/1/2018</a:t>
+              <a:t>4/14/2019</a:t>
             </a:fld>
             <a:endParaRPr lang="en-US"/>
           </a:p>
@@ -2856,7 +2856,7 @@
           <a:p>
             <a:fld id="{78C97017-6FC3-485B-9764-EAC9E56C1D49}" type="datetimeFigureOut">
               <a:rPr lang="en-US" smtClean="0"/>
-              <a:t>12/1/2018</a:t>
+              <a:t>4/14/2019</a:t>
             </a:fld>
             <a:endParaRPr lang="en-US"/>
           </a:p>
@@ -3067,7 +3067,7 @@
           <a:p>
             <a:fld id="{78C97017-6FC3-485B-9764-EAC9E56C1D49}" type="datetimeFigureOut">
               <a:rPr lang="en-US" smtClean="0"/>
-              <a:t>12/1/2018</a:t>
+              <a:t>4/14/2019</a:t>
             </a:fld>
             <a:endParaRPr lang="en-US"/>
           </a:p>
@@ -3450,8 +3450,8 @@
         </p:nvSpPr>
         <p:spPr>
           <a:xfrm>
-            <a:off x="1119865" y="2086382"/>
-            <a:ext cx="7871735" cy="1723618"/>
+            <a:off x="457200" y="1828800"/>
+            <a:ext cx="8077200" cy="3323818"/>
           </a:xfrm>
           <a:prstGeom prst="roundRect">
             <a:avLst>
@@ -3515,7 +3515,7 @@
         </p:nvSpPr>
         <p:spPr>
           <a:xfrm>
-            <a:off x="2877180" y="3158440"/>
+            <a:off x="2214515" y="2900858"/>
             <a:ext cx="1323049" cy="346760"/>
           </a:xfrm>
           <a:prstGeom prst="rect">
@@ -3593,7 +3593,7 @@
         </p:nvSpPr>
         <p:spPr>
           <a:xfrm rot="16200000">
-            <a:off x="1683963" y="2868687"/>
+            <a:off x="1021298" y="2611105"/>
             <a:ext cx="1093635" cy="346760"/>
           </a:xfrm>
           <a:prstGeom prst="rect">
@@ -3656,7 +3656,7 @@
         </p:nvSpPr>
         <p:spPr>
           <a:xfrm rot="16200000">
-            <a:off x="956202" y="2861202"/>
+            <a:off x="293537" y="2603620"/>
             <a:ext cx="1093635" cy="346760"/>
           </a:xfrm>
           <a:prstGeom prst="rect">
@@ -3730,7 +3730,7 @@
         </p:nvSpPr>
         <p:spPr>
           <a:xfrm rot="16200000">
-            <a:off x="1626910" y="2952291"/>
+            <a:off x="964245" y="2694709"/>
             <a:ext cx="270504" cy="175523"/>
           </a:xfrm>
           <a:prstGeom prst="triangle">
@@ -3788,7 +3788,7 @@
         </p:nvCxnSpPr>
         <p:spPr>
           <a:xfrm>
-            <a:off x="2656370" y="3326536"/>
+            <a:off x="1993705" y="3068954"/>
             <a:ext cx="220810" cy="5284"/>
           </a:xfrm>
           <a:prstGeom prst="straightConnector1">
@@ -3828,7 +3828,7 @@
         </p:nvCxnSpPr>
         <p:spPr>
           <a:xfrm>
-            <a:off x="910091" y="3040053"/>
+            <a:off x="247426" y="2782471"/>
             <a:ext cx="419548" cy="2860"/>
           </a:xfrm>
           <a:prstGeom prst="bentConnector3">
@@ -3873,7 +3873,7 @@
         </p:nvCxnSpPr>
         <p:spPr>
           <a:xfrm flipV="1">
-            <a:off x="1849924" y="3040052"/>
+            <a:off x="1187259" y="2782470"/>
             <a:ext cx="216105" cy="1"/>
           </a:xfrm>
           <a:prstGeom prst="line">
@@ -3914,7 +3914,7 @@
         </p:nvSpPr>
         <p:spPr>
           <a:xfrm>
-            <a:off x="2420322" y="3239846"/>
+            <a:off x="1757657" y="2982264"/>
             <a:ext cx="236048" cy="173380"/>
           </a:xfrm>
           <a:prstGeom prst="flowChartDecision">
@@ -3968,7 +3968,7 @@
         </p:nvCxnSpPr>
         <p:spPr>
           <a:xfrm flipV="1">
-            <a:off x="4398041" y="3331820"/>
+            <a:off x="3735376" y="3074238"/>
             <a:ext cx="223324" cy="1"/>
           </a:xfrm>
           <a:prstGeom prst="bentConnector3">
@@ -4011,7 +4011,7 @@
         </p:nvSpPr>
         <p:spPr>
           <a:xfrm rot="5400000" flipV="1">
-            <a:off x="4175027" y="3244059"/>
+            <a:off x="3512362" y="2986477"/>
             <a:ext cx="270504" cy="175523"/>
           </a:xfrm>
           <a:prstGeom prst="triangle">
@@ -4069,7 +4069,7 @@
         </p:nvCxnSpPr>
         <p:spPr>
           <a:xfrm>
-            <a:off x="5791200" y="3331820"/>
+            <a:off x="5128535" y="3074238"/>
             <a:ext cx="228600" cy="1970"/>
           </a:xfrm>
           <a:prstGeom prst="bentConnector3">
@@ -4112,7 +4112,7 @@
         </p:nvSpPr>
         <p:spPr>
           <a:xfrm>
-            <a:off x="4621365" y="3158440"/>
+            <a:off x="3958700" y="2900858"/>
             <a:ext cx="1169835" cy="346760"/>
           </a:xfrm>
           <a:prstGeom prst="rect">
@@ -4187,7 +4187,7 @@
         </p:nvSpPr>
         <p:spPr>
           <a:xfrm>
-            <a:off x="2873943" y="2558040"/>
+            <a:off x="2211278" y="2300458"/>
             <a:ext cx="1323049" cy="346760"/>
           </a:xfrm>
           <a:prstGeom prst="rect">
@@ -4268,7 +4268,7 @@
         </p:nvCxnSpPr>
         <p:spPr>
           <a:xfrm>
-            <a:off x="2653133" y="2726136"/>
+            <a:off x="1990468" y="2468554"/>
             <a:ext cx="220810" cy="5284"/>
           </a:xfrm>
           <a:prstGeom prst="straightConnector1">
@@ -4308,7 +4308,7 @@
         </p:nvSpPr>
         <p:spPr>
           <a:xfrm>
-            <a:off x="2417085" y="2639446"/>
+            <a:off x="1754420" y="2381864"/>
             <a:ext cx="236048" cy="173380"/>
           </a:xfrm>
           <a:prstGeom prst="flowChartDecision">
@@ -4362,7 +4362,7 @@
         </p:nvCxnSpPr>
         <p:spPr>
           <a:xfrm flipV="1">
-            <a:off x="4394804" y="2731420"/>
+            <a:off x="3732139" y="2473838"/>
             <a:ext cx="223324" cy="1"/>
           </a:xfrm>
           <a:prstGeom prst="bentConnector3">
@@ -4405,7 +4405,7 @@
         </p:nvSpPr>
         <p:spPr>
           <a:xfrm rot="5400000" flipV="1">
-            <a:off x="4171790" y="2643659"/>
+            <a:off x="3509125" y="2386077"/>
             <a:ext cx="270504" cy="175523"/>
           </a:xfrm>
           <a:prstGeom prst="triangle">
@@ -4460,7 +4460,7 @@
         </p:nvSpPr>
         <p:spPr>
           <a:xfrm>
-            <a:off x="4618128" y="2558040"/>
+            <a:off x="3955463" y="2300458"/>
             <a:ext cx="1093635" cy="346760"/>
           </a:xfrm>
           <a:prstGeom prst="rect">
@@ -4538,7 +4538,7 @@
         </p:nvSpPr>
         <p:spPr>
           <a:xfrm>
-            <a:off x="6019800" y="3160410"/>
+            <a:off x="5357135" y="2902828"/>
             <a:ext cx="1200707" cy="346760"/>
           </a:xfrm>
           <a:prstGeom prst="rect">
@@ -4617,8 +4617,8 @@
         </p:nvCxnSpPr>
         <p:spPr>
           <a:xfrm rot="16200000" flipV="1">
-            <a:off x="8077993" y="2992019"/>
-            <a:ext cx="335208" cy="1"/>
+            <a:off x="7538031" y="2734437"/>
+            <a:ext cx="335208" cy="2"/>
           </a:xfrm>
           <a:prstGeom prst="bentConnector3">
             <a:avLst>
@@ -4655,7 +4655,7 @@
         </p:nvSpPr>
         <p:spPr>
           <a:xfrm>
-            <a:off x="7615736" y="2477656"/>
+            <a:off x="7075774" y="2220074"/>
             <a:ext cx="1259719" cy="346760"/>
           </a:xfrm>
           <a:prstGeom prst="rect">
@@ -4711,8 +4711,8 @@
         </p:nvSpPr>
         <p:spPr>
           <a:xfrm>
-            <a:off x="7615738" y="3159624"/>
-            <a:ext cx="1259718" cy="346760"/>
+            <a:off x="6953072" y="2902042"/>
+            <a:ext cx="1505128" cy="346760"/>
           </a:xfrm>
           <a:prstGeom prst="rect">
             <a:avLst/>
@@ -4747,7 +4747,7 @@
                   </a:schemeClr>
                 </a:solidFill>
               </a:rPr>
-              <a:t>JsonAdaptedPerson</a:t>
+              <a:t>JsonAdaptedParticipant</a:t>
             </a:r>
             <a:endParaRPr lang="en-SG" sz="1030" b="1" dirty="0">
               <a:solidFill>
@@ -4763,6 +4763,7 @@
         <p:nvCxnSpPr>
           <p:cNvPr id="77" name="Elbow Connector 122"/>
           <p:cNvCxnSpPr>
+            <a:cxnSpLocks/>
             <a:stCxn id="66" idx="3"/>
             <a:endCxn id="74" idx="1"/>
           </p:cNvCxnSpPr>
@@ -4770,13 +4771,227 @@
         </p:nvCxnSpPr>
         <p:spPr>
           <a:xfrm flipV="1">
-            <a:off x="7220507" y="3333004"/>
-            <a:ext cx="395231" cy="786"/>
+            <a:off x="6557842" y="3075422"/>
+            <a:ext cx="395230" cy="786"/>
           </a:xfrm>
           <a:prstGeom prst="bentConnector3">
             <a:avLst>
               <a:gd name="adj1" fmla="val 50000"/>
             </a:avLst>
+          </a:prstGeom>
+          <a:ln w="19050">
+            <a:prstDash val="sysDot"/>
+            <a:headEnd type="none" w="med" len="med"/>
+            <a:tailEnd type="arrow" w="med" len="med"/>
+          </a:ln>
+          <a:effectLst/>
+        </p:spPr>
+        <p:style>
+          <a:lnRef idx="1">
+            <a:schemeClr val="accent6"/>
+          </a:lnRef>
+          <a:fillRef idx="2">
+            <a:schemeClr val="accent6"/>
+          </a:fillRef>
+          <a:effectRef idx="1">
+            <a:schemeClr val="accent6"/>
+          </a:effectRef>
+          <a:fontRef idx="minor">
+            <a:schemeClr val="dk1"/>
+          </a:fontRef>
+        </p:style>
+      </p:cxnSp>
+      <p:sp>
+        <p:nvSpPr>
+          <p:cNvPr id="26" name="Rectangle 8">
+            <a:extLst>
+              <a:ext uri="{FF2B5EF4-FFF2-40B4-BE49-F238E27FC236}">
+                <a16:creationId xmlns:a16="http://schemas.microsoft.com/office/drawing/2014/main" id="{7342958B-EFDF-48F8-8537-E7B500D4B17F}"/>
+              </a:ext>
+            </a:extLst>
+          </p:cNvPr>
+          <p:cNvSpPr/>
+          <p:nvPr/>
+        </p:nvSpPr>
+        <p:spPr>
+          <a:xfrm>
+            <a:off x="6953071" y="3466696"/>
+            <a:ext cx="1505128" cy="346760"/>
+          </a:xfrm>
+          <a:prstGeom prst="rect">
+            <a:avLst/>
+          </a:prstGeom>
+          <a:ln w="19050"/>
+          <a:effectLst/>
+        </p:spPr>
+        <p:style>
+          <a:lnRef idx="1">
+            <a:schemeClr val="accent6"/>
+          </a:lnRef>
+          <a:fillRef idx="2">
+            <a:schemeClr val="accent6"/>
+          </a:fillRef>
+          <a:effectRef idx="1">
+            <a:schemeClr val="accent6"/>
+          </a:effectRef>
+          <a:fontRef idx="minor">
+            <a:schemeClr val="dk1"/>
+          </a:fontRef>
+        </p:style>
+        <p:txBody>
+          <a:bodyPr rtlCol="0" anchor="ctr"/>
+          <a:lstStyle/>
+          <a:p>
+            <a:pPr algn="ctr"/>
+            <a:r>
+              <a:rPr lang="en-US" sz="1030" b="1" dirty="0" err="1">
+                <a:solidFill>
+                  <a:schemeClr val="accent6">
+                    <a:lumMod val="75000"/>
+                  </a:schemeClr>
+                </a:solidFill>
+              </a:rPr>
+              <a:t>JsonAdaptedGroup</a:t>
+            </a:r>
+            <a:endParaRPr lang="en-SG" sz="1030" b="1" dirty="0">
+              <a:solidFill>
+                <a:schemeClr val="accent6">
+                  <a:lumMod val="75000"/>
+                </a:schemeClr>
+              </a:solidFill>
+            </a:endParaRPr>
+          </a:p>
+        </p:txBody>
+      </p:sp>
+      <p:sp>
+        <p:nvSpPr>
+          <p:cNvPr id="31" name="Rectangle 8">
+            <a:extLst>
+              <a:ext uri="{FF2B5EF4-FFF2-40B4-BE49-F238E27FC236}">
+                <a16:creationId xmlns:a16="http://schemas.microsoft.com/office/drawing/2014/main" id="{C62055E9-3AD4-4C52-BB2B-7BB81949ADC7}"/>
+              </a:ext>
+            </a:extLst>
+          </p:cNvPr>
+          <p:cNvSpPr/>
+          <p:nvPr/>
+        </p:nvSpPr>
+        <p:spPr>
+          <a:xfrm>
+            <a:off x="6953071" y="4030564"/>
+            <a:ext cx="1505127" cy="346760"/>
+          </a:xfrm>
+          <a:prstGeom prst="rect">
+            <a:avLst/>
+          </a:prstGeom>
+          <a:ln w="19050"/>
+          <a:effectLst/>
+        </p:spPr>
+        <p:style>
+          <a:lnRef idx="1">
+            <a:schemeClr val="accent6"/>
+          </a:lnRef>
+          <a:fillRef idx="2">
+            <a:schemeClr val="accent6"/>
+          </a:fillRef>
+          <a:effectRef idx="1">
+            <a:schemeClr val="accent6"/>
+          </a:effectRef>
+          <a:fontRef idx="minor">
+            <a:schemeClr val="dk1"/>
+          </a:fontRef>
+        </p:style>
+        <p:txBody>
+          <a:bodyPr rtlCol="0" anchor="ctr"/>
+          <a:lstStyle/>
+          <a:p>
+            <a:pPr algn="ctr"/>
+            <a:r>
+              <a:rPr lang="en-US" sz="1030" b="1">
+                <a:solidFill>
+                  <a:schemeClr val="accent6">
+                    <a:lumMod val="75000"/>
+                  </a:schemeClr>
+                </a:solidFill>
+              </a:rPr>
+              <a:t>JsonAdaptedHouse</a:t>
+            </a:r>
+            <a:endParaRPr lang="en-SG" sz="1030" b="1" dirty="0">
+              <a:solidFill>
+                <a:schemeClr val="accent6">
+                  <a:lumMod val="75000"/>
+                </a:schemeClr>
+              </a:solidFill>
+            </a:endParaRPr>
+          </a:p>
+        </p:txBody>
+      </p:sp>
+      <p:cxnSp>
+        <p:nvCxnSpPr>
+          <p:cNvPr id="43" name="Elbow Connector 122">
+            <a:extLst>
+              <a:ext uri="{FF2B5EF4-FFF2-40B4-BE49-F238E27FC236}">
+                <a16:creationId xmlns:a16="http://schemas.microsoft.com/office/drawing/2014/main" id="{347EA310-3407-44FD-A690-4896CB352436}"/>
+              </a:ext>
+            </a:extLst>
+          </p:cNvPr>
+          <p:cNvCxnSpPr>
+            <a:cxnSpLocks/>
+            <a:stCxn id="66" idx="2"/>
+          </p:cNvCxnSpPr>
+          <p:nvPr/>
+        </p:nvCxnSpPr>
+        <p:spPr>
+          <a:xfrm rot="16200000" flipH="1">
+            <a:off x="6251274" y="2955803"/>
+            <a:ext cx="408012" cy="995582"/>
+          </a:xfrm>
+          <a:prstGeom prst="bentConnector2">
+            <a:avLst/>
+          </a:prstGeom>
+          <a:ln w="19050">
+            <a:prstDash val="sysDot"/>
+            <a:headEnd type="none" w="med" len="med"/>
+            <a:tailEnd type="arrow" w="med" len="med"/>
+          </a:ln>
+          <a:effectLst/>
+        </p:spPr>
+        <p:style>
+          <a:lnRef idx="1">
+            <a:schemeClr val="accent6"/>
+          </a:lnRef>
+          <a:fillRef idx="2">
+            <a:schemeClr val="accent6"/>
+          </a:fillRef>
+          <a:effectRef idx="1">
+            <a:schemeClr val="accent6"/>
+          </a:effectRef>
+          <a:fontRef idx="minor">
+            <a:schemeClr val="dk1"/>
+          </a:fontRef>
+        </p:style>
+      </p:cxnSp>
+      <p:cxnSp>
+        <p:nvCxnSpPr>
+          <p:cNvPr id="45" name="Elbow Connector 122">
+            <a:extLst>
+              <a:ext uri="{FF2B5EF4-FFF2-40B4-BE49-F238E27FC236}">
+                <a16:creationId xmlns:a16="http://schemas.microsoft.com/office/drawing/2014/main" id="{F1A47D30-0CB7-40BF-AB40-3449CA7BFD5E}"/>
+              </a:ext>
+            </a:extLst>
+          </p:cNvPr>
+          <p:cNvCxnSpPr>
+            <a:cxnSpLocks/>
+            <a:stCxn id="66" idx="2"/>
+          </p:cNvCxnSpPr>
+          <p:nvPr/>
+        </p:nvCxnSpPr>
+        <p:spPr>
+          <a:xfrm rot="16200000" flipH="1">
+            <a:off x="5969339" y="3237738"/>
+            <a:ext cx="971880" cy="995580"/>
+          </a:xfrm>
+          <a:prstGeom prst="bentConnector2">
+            <a:avLst/>
           </a:prstGeom>
           <a:ln w="19050">
             <a:prstDash val="sysDot"/>

</xml_diff>